<commit_message>
optimize plots by update plots instead of clearing
</commit_message>
<xml_diff>
--- a/Projektverlauf.pptx
+++ b/Projektverlauf.pptx
@@ -5,7 +5,7 @@
     <p:sldMasterId id="2147483660" r:id="rId1"/>
   </p:sldMasterIdLst>
   <p:notesMasterIdLst>
-    <p:notesMasterId r:id="rId10"/>
+    <p:notesMasterId r:id="rId12"/>
   </p:notesMasterIdLst>
   <p:sldIdLst>
     <p:sldId id="258" r:id="rId2"/>
@@ -15,7 +15,9 @@
     <p:sldId id="262" r:id="rId6"/>
     <p:sldId id="264" r:id="rId7"/>
     <p:sldId id="265" r:id="rId8"/>
-    <p:sldId id="259" r:id="rId9"/>
+    <p:sldId id="266" r:id="rId9"/>
+    <p:sldId id="267" r:id="rId10"/>
+    <p:sldId id="259" r:id="rId11"/>
   </p:sldIdLst>
   <p:sldSz cx="12192000" cy="6858000"/>
   <p:notesSz cx="6858000" cy="9144000"/>
@@ -425,7 +427,7 @@
           <a:p>
             <a:fld id="{556C8D3A-C9AC-4E8C-B5B4-449B2A3F85BA}" type="datetimeFigureOut">
               <a:rPr lang="de-DE" smtClean="0"/>
-              <a:t>08.12.2023</a:t>
+              <a:t>12.12.2023</a:t>
             </a:fld>
             <a:endParaRPr lang="de-DE"/>
           </a:p>
@@ -950,7 +952,7 @@
           <a:p>
             <a:fld id="{444ABF0E-CEE9-4329-9A06-8640FCA04ECF}" type="datetime1">
               <a:rPr lang="de-DE" smtClean="0"/>
-              <a:t>08.12.2023</a:t>
+              <a:t>12.12.2023</a:t>
             </a:fld>
             <a:endParaRPr lang="de-DE"/>
           </a:p>
@@ -1227,7 +1229,7 @@
           <a:p>
             <a:fld id="{CC10B3C9-ABD8-4175-ADB7-44BB334DBA1F}" type="datetime1">
               <a:rPr lang="de-DE" smtClean="0"/>
-              <a:t>08.12.2023</a:t>
+              <a:t>12.12.2023</a:t>
             </a:fld>
             <a:endParaRPr lang="de-DE"/>
           </a:p>
@@ -1393,7 +1395,7 @@
           <a:p>
             <a:fld id="{444ABF0E-CEE9-4329-9A06-8640FCA04ECF}" type="datetime1">
               <a:rPr lang="de-DE" smtClean="0"/>
-              <a:t>08.12.2023</a:t>
+              <a:t>12.12.2023</a:t>
             </a:fld>
             <a:endParaRPr lang="de-DE"/>
           </a:p>
@@ -1560,7 +1562,7 @@
           <a:p>
             <a:fld id="{444ABF0E-CEE9-4329-9A06-8640FCA04ECF}" type="datetime1">
               <a:rPr lang="de-DE" smtClean="0"/>
-              <a:t>08.12.2023</a:t>
+              <a:t>12.12.2023</a:t>
             </a:fld>
             <a:endParaRPr lang="de-DE"/>
           </a:p>
@@ -2177,6 +2179,166 @@
 </p:sld>
 </file>
 
+<file path=ppt/slides/slide10.xml><?xml version="1.0" encoding="utf-8"?>
+<p:sld xmlns:a="http://schemas.openxmlformats.org/drawingml/2006/main" xmlns:r="http://schemas.openxmlformats.org/officeDocument/2006/relationships" xmlns:p="http://schemas.openxmlformats.org/presentationml/2006/main">
+  <p:cSld>
+    <p:spTree>
+      <p:nvGrpSpPr>
+        <p:cNvPr id="1" name=""/>
+        <p:cNvGrpSpPr/>
+        <p:nvPr/>
+      </p:nvGrpSpPr>
+      <p:grpSpPr>
+        <a:xfrm>
+          <a:off x="0" y="0"/>
+          <a:ext cx="0" cy="0"/>
+          <a:chOff x="0" y="0"/>
+          <a:chExt cx="0" cy="0"/>
+        </a:xfrm>
+      </p:grpSpPr>
+      <p:sp>
+        <p:nvSpPr>
+          <p:cNvPr id="3" name="Datumsplatzhalter 2"/>
+          <p:cNvSpPr>
+            <a:spLocks noGrp="1"/>
+          </p:cNvSpPr>
+          <p:nvPr>
+            <p:ph type="dt" sz="half" idx="14"/>
+          </p:nvPr>
+        </p:nvSpPr>
+        <p:spPr/>
+        <p:txBody>
+          <a:bodyPr/>
+          <a:lstStyle/>
+          <a:p>
+            <a:fld id="{444ABF0E-CEE9-4329-9A06-8640FCA04ECF}" type="datetime1">
+              <a:rPr lang="de-DE" smtClean="0"/>
+              <a:t>12.12.2023</a:t>
+            </a:fld>
+            <a:endParaRPr lang="de-DE"/>
+          </a:p>
+        </p:txBody>
+      </p:sp>
+      <p:sp>
+        <p:nvSpPr>
+          <p:cNvPr id="4" name="Fußzeilenplatzhalter 3"/>
+          <p:cNvSpPr>
+            <a:spLocks noGrp="1"/>
+          </p:cNvSpPr>
+          <p:nvPr>
+            <p:ph type="ftr" sz="quarter" idx="15"/>
+          </p:nvPr>
+        </p:nvSpPr>
+        <p:spPr/>
+        <p:txBody>
+          <a:bodyPr/>
+          <a:lstStyle/>
+          <a:p>
+            <a:r>
+              <a:rPr lang="de-DE" dirty="0"/>
+              <a:t>Heiko Waschek, Tim Keicher</a:t>
+            </a:r>
+          </a:p>
+        </p:txBody>
+      </p:sp>
+      <p:sp>
+        <p:nvSpPr>
+          <p:cNvPr id="5" name="Foliennummernplatzhalter 4"/>
+          <p:cNvSpPr>
+            <a:spLocks noGrp="1"/>
+          </p:cNvSpPr>
+          <p:nvPr>
+            <p:ph type="sldNum" sz="quarter" idx="16"/>
+          </p:nvPr>
+        </p:nvSpPr>
+        <p:spPr/>
+        <p:txBody>
+          <a:bodyPr/>
+          <a:lstStyle/>
+          <a:p>
+            <a:fld id="{813E575C-CD74-45A2-8EB8-54D624340A2E}" type="slidenum">
+              <a:rPr lang="de-DE" smtClean="0"/>
+              <a:pPr/>
+              <a:t>10</a:t>
+            </a:fld>
+            <a:r>
+              <a:rPr lang="de-DE"/>
+              <a:t> / 15</a:t>
+            </a:r>
+          </a:p>
+        </p:txBody>
+      </p:sp>
+      <p:sp>
+        <p:nvSpPr>
+          <p:cNvPr id="6" name="Textplatzhalter 5"/>
+          <p:cNvSpPr>
+            <a:spLocks noGrp="1"/>
+          </p:cNvSpPr>
+          <p:nvPr>
+            <p:ph type="body" sz="quarter" idx="17"/>
+          </p:nvPr>
+        </p:nvSpPr>
+        <p:spPr>
+          <a:xfrm>
+            <a:off x="746836" y="1704975"/>
+            <a:ext cx="5153031" cy="4287838"/>
+          </a:xfrm>
+        </p:spPr>
+        <p:txBody>
+          <a:bodyPr anchor="ctr"/>
+          <a:lstStyle/>
+          <a:p>
+            <a:pPr algn="ctr"/>
+            <a:r>
+              <a:rPr lang="de-DE" sz="4800" dirty="0"/>
+              <a:t>Vielen Dank für ihre Aufmerksamkeit!</a:t>
+            </a:r>
+          </a:p>
+        </p:txBody>
+      </p:sp>
+      <p:pic>
+        <p:nvPicPr>
+          <p:cNvPr id="9" name="Grafik 8">
+            <a:extLst>
+              <a:ext uri="{FF2B5EF4-FFF2-40B4-BE49-F238E27FC236}">
+                <a16:creationId xmlns:a16="http://schemas.microsoft.com/office/drawing/2014/main" id="{943B142F-4BD2-EC40-119F-E07871F7C0CA}"/>
+              </a:ext>
+            </a:extLst>
+          </p:cNvPr>
+          <p:cNvPicPr>
+            <a:picLocks noChangeAspect="1"/>
+          </p:cNvPicPr>
+          <p:nvPr/>
+        </p:nvPicPr>
+        <p:blipFill>
+          <a:blip r:embed="rId2"/>
+          <a:stretch>
+            <a:fillRect/>
+          </a:stretch>
+        </p:blipFill>
+        <p:spPr>
+          <a:xfrm>
+            <a:off x="6292135" y="2322725"/>
+            <a:ext cx="5402607" cy="3045980"/>
+          </a:xfrm>
+          <a:prstGeom prst="rect">
+            <a:avLst/>
+          </a:prstGeom>
+        </p:spPr>
+      </p:pic>
+    </p:spTree>
+    <p:extLst>
+      <p:ext uri="{BB962C8B-B14F-4D97-AF65-F5344CB8AC3E}">
+        <p14:creationId xmlns:p14="http://schemas.microsoft.com/office/powerpoint/2010/main" val="1047420940"/>
+      </p:ext>
+    </p:extLst>
+  </p:cSld>
+  <p:clrMapOvr>
+    <a:masterClrMapping/>
+  </p:clrMapOvr>
+</p:sld>
+</file>
+
 <file path=ppt/slides/slide2.xml><?xml version="1.0" encoding="utf-8"?>
 <p:sld xmlns:a="http://schemas.openxmlformats.org/drawingml/2006/main" xmlns:r="http://schemas.openxmlformats.org/officeDocument/2006/relationships" xmlns:p="http://schemas.openxmlformats.org/presentationml/2006/main">
   <p:cSld>
@@ -2239,7 +2401,7 @@
           <a:p>
             <a:fld id="{444ABF0E-CEE9-4329-9A06-8640FCA04ECF}" type="datetime1">
               <a:rPr lang="de-DE" smtClean="0"/>
-              <a:t>08.12.2023</a:t>
+              <a:t>12.12.2023</a:t>
             </a:fld>
             <a:endParaRPr lang="de-DE"/>
           </a:p>
@@ -2324,6 +2486,12 @@
             <a:r>
               <a:rPr lang="de-DE" dirty="0"/>
               <a:t>Projektplanung</a:t>
+            </a:r>
+          </a:p>
+          <a:p>
+            <a:r>
+              <a:rPr lang="de-DE" dirty="0"/>
+              <a:t>Plot Optimierung</a:t>
             </a:r>
           </a:p>
         </p:txBody>
@@ -2574,7 +2742,7 @@
           <a:p>
             <a:fld id="{CC10B3C9-ABD8-4175-ADB7-44BB334DBA1F}" type="datetime1">
               <a:rPr lang="de-DE" smtClean="0"/>
-              <a:t>08.12.2023</a:t>
+              <a:t>12.12.2023</a:t>
             </a:fld>
             <a:endParaRPr lang="de-DE"/>
           </a:p>
@@ -2881,7 +3049,7 @@
           <a:p>
             <a:fld id="{CC10B3C9-ABD8-4175-ADB7-44BB334DBA1F}" type="datetime1">
               <a:rPr lang="de-DE" smtClean="0"/>
-              <a:t>08.12.2023</a:t>
+              <a:t>12.12.2023</a:t>
             </a:fld>
             <a:endParaRPr lang="de-DE"/>
           </a:p>
@@ -3121,7 +3289,7 @@
           <a:p>
             <a:fld id="{CC10B3C9-ABD8-4175-ADB7-44BB334DBA1F}" type="datetime1">
               <a:rPr lang="de-DE" smtClean="0"/>
-              <a:t>08.12.2023</a:t>
+              <a:t>12.12.2023</a:t>
             </a:fld>
             <a:endParaRPr lang="de-DE"/>
           </a:p>
@@ -3368,7 +3536,7 @@
           <a:p>
             <a:fld id="{CC10B3C9-ABD8-4175-ADB7-44BB334DBA1F}" type="datetime1">
               <a:rPr lang="de-DE" smtClean="0"/>
-              <a:t>08.12.2023</a:t>
+              <a:t>12.12.2023</a:t>
             </a:fld>
             <a:endParaRPr lang="de-DE" dirty="0"/>
           </a:p>
@@ -3578,7 +3746,7 @@
           <a:p>
             <a:fld id="{CC10B3C9-ABD8-4175-ADB7-44BB334DBA1F}" type="datetime1">
               <a:rPr lang="de-DE" smtClean="0"/>
-              <a:t>08.12.2023</a:t>
+              <a:t>12.12.2023</a:t>
             </a:fld>
             <a:endParaRPr lang="de-DE"/>
           </a:p>
@@ -3678,12 +3846,51 @@
       </p:grpSpPr>
       <p:sp>
         <p:nvSpPr>
-          <p:cNvPr id="3" name="Datumsplatzhalter 2"/>
-          <p:cNvSpPr>
-            <a:spLocks noGrp="1"/>
-          </p:cNvSpPr>
-          <p:nvPr>
-            <p:ph type="dt" sz="half" idx="14"/>
+          <p:cNvPr id="2" name="Titel 1">
+            <a:extLst>
+              <a:ext uri="{FF2B5EF4-FFF2-40B4-BE49-F238E27FC236}">
+                <a16:creationId xmlns:a16="http://schemas.microsoft.com/office/drawing/2014/main" id="{D0DD90DF-6D32-27FB-D36E-C3A28F62445A}"/>
+              </a:ext>
+            </a:extLst>
+          </p:cNvPr>
+          <p:cNvSpPr>
+            <a:spLocks noGrp="1"/>
+          </p:cNvSpPr>
+          <p:nvPr>
+            <p:ph type="title"/>
+          </p:nvPr>
+        </p:nvSpPr>
+        <p:spPr>
+          <a:xfrm>
+            <a:off x="838200" y="751438"/>
+            <a:ext cx="10515600" cy="939250"/>
+          </a:xfrm>
+        </p:spPr>
+        <p:txBody>
+          <a:bodyPr/>
+          <a:lstStyle/>
+          <a:p>
+            <a:r>
+              <a:rPr lang="de-DE" dirty="0"/>
+              <a:t>Plot Optimierung</a:t>
+            </a:r>
+          </a:p>
+        </p:txBody>
+      </p:sp>
+      <p:sp>
+        <p:nvSpPr>
+          <p:cNvPr id="3" name="Inhaltsplatzhalter 2">
+            <a:extLst>
+              <a:ext uri="{FF2B5EF4-FFF2-40B4-BE49-F238E27FC236}">
+                <a16:creationId xmlns:a16="http://schemas.microsoft.com/office/drawing/2014/main" id="{487A8827-801D-86F4-8BDA-7187B94A903D}"/>
+              </a:ext>
+            </a:extLst>
+          </p:cNvPr>
+          <p:cNvSpPr>
+            <a:spLocks noGrp="1"/>
+          </p:cNvSpPr>
+          <p:nvPr>
+            <p:ph idx="1"/>
           </p:nvPr>
         </p:nvSpPr>
         <p:spPr/>
@@ -3691,9 +3898,164 @@
           <a:bodyPr/>
           <a:lstStyle/>
           <a:p>
-            <a:fld id="{444ABF0E-CEE9-4329-9A06-8640FCA04ECF}" type="datetime1">
+            <a:r>
+              <a:rPr lang="de-DE" dirty="0"/>
+              <a:t>Original Test 1: </a:t>
+            </a:r>
+          </a:p>
+          <a:p>
+            <a:pPr lvl="1"/>
+            <a:r>
+              <a:rPr lang="de-DE" dirty="0"/>
+              <a:t>Plotten des Rechtecks mit Robotergelenke, </a:t>
+            </a:r>
+            <a:r>
+              <a:rPr lang="de-DE" dirty="0" err="1"/>
+              <a:t>Geschw</a:t>
+            </a:r>
+            <a:r>
+              <a:rPr lang="de-DE" dirty="0"/>
+              <a:t>- und Beschleunigungsvektor sowie das Erstellen des </a:t>
+            </a:r>
+            <a:r>
+              <a:rPr lang="de-DE" dirty="0" err="1"/>
+              <a:t>Gifs</a:t>
+            </a:r>
+            <a:r>
+              <a:rPr lang="de-DE" dirty="0"/>
+              <a:t>. Der </a:t>
+            </a:r>
+            <a:r>
+              <a:rPr lang="de-DE" dirty="0" err="1"/>
+              <a:t>rest</a:t>
+            </a:r>
+            <a:r>
+              <a:rPr lang="de-DE" dirty="0"/>
+              <a:t> wurde auskommentiert.</a:t>
+            </a:r>
+          </a:p>
+          <a:p>
+            <a:pPr lvl="1"/>
+            <a:r>
+              <a:rPr lang="de-DE" dirty="0"/>
+              <a:t>Gemessen mit Tic/</a:t>
+            </a:r>
+            <a:r>
+              <a:rPr lang="de-DE" dirty="0" err="1"/>
+              <a:t>Toc</a:t>
+            </a:r>
+            <a:r>
+              <a:rPr lang="de-DE" dirty="0"/>
+              <a:t> Funktion Tic unter Figure, </a:t>
+            </a:r>
+            <a:r>
+              <a:rPr lang="de-DE" dirty="0" err="1"/>
+              <a:t>Toc</a:t>
+            </a:r>
+            <a:r>
+              <a:rPr lang="de-DE" dirty="0"/>
+              <a:t> am Ende der </a:t>
+            </a:r>
+            <a:r>
+              <a:rPr lang="de-DE" dirty="0" err="1"/>
+              <a:t>For</a:t>
+            </a:r>
+            <a:r>
+              <a:rPr lang="de-DE" dirty="0"/>
+              <a:t>-Loop</a:t>
+            </a:r>
+          </a:p>
+          <a:p>
+            <a:pPr lvl="1"/>
+            <a:r>
+              <a:rPr lang="de-DE" dirty="0"/>
+              <a:t>Branch </a:t>
+            </a:r>
+            <a:r>
+              <a:rPr lang="de-DE" dirty="0" err="1"/>
+              <a:t>master</a:t>
+            </a:r>
+            <a:r>
+              <a:rPr lang="de-DE" dirty="0"/>
+              <a:t> 12.12.2023</a:t>
+            </a:r>
+          </a:p>
+          <a:p>
+            <a:pPr lvl="1"/>
+            <a:r>
+              <a:rPr lang="de-DE" dirty="0"/>
+              <a:t>Dauer = 58,46 Sekunden</a:t>
+            </a:r>
+          </a:p>
+          <a:p>
+            <a:pPr lvl="1"/>
+            <a:endParaRPr lang="de-DE" dirty="0"/>
+          </a:p>
+          <a:p>
+            <a:r>
+              <a:rPr lang="de-DE" dirty="0"/>
+              <a:t>Optimierung v1 Test 1:</a:t>
+            </a:r>
+          </a:p>
+          <a:p>
+            <a:pPr lvl="1"/>
+            <a:r>
+              <a:rPr lang="de-DE" dirty="0"/>
+              <a:t>Getestete Funktionen und Messung wie in Original Test 1</a:t>
+            </a:r>
+          </a:p>
+          <a:p>
+            <a:pPr lvl="1"/>
+            <a:r>
+              <a:rPr lang="de-DE" dirty="0"/>
+              <a:t>Dauer = 31,88 Sekunden</a:t>
+            </a:r>
+          </a:p>
+          <a:p>
+            <a:pPr lvl="1"/>
+            <a:endParaRPr lang="de-DE" dirty="0"/>
+          </a:p>
+          <a:p>
+            <a:endParaRPr lang="de-DE" dirty="0"/>
+          </a:p>
+          <a:p>
+            <a:endParaRPr lang="de-DE" dirty="0"/>
+          </a:p>
+          <a:p>
+            <a:endParaRPr lang="de-DE" dirty="0"/>
+          </a:p>
+          <a:p>
+            <a:endParaRPr lang="de-DE" dirty="0"/>
+          </a:p>
+          <a:p>
+            <a:endParaRPr lang="de-DE" dirty="0"/>
+          </a:p>
+        </p:txBody>
+      </p:sp>
+      <p:sp>
+        <p:nvSpPr>
+          <p:cNvPr id="4" name="Datumsplatzhalter 3">
+            <a:extLst>
+              <a:ext uri="{FF2B5EF4-FFF2-40B4-BE49-F238E27FC236}">
+                <a16:creationId xmlns:a16="http://schemas.microsoft.com/office/drawing/2014/main" id="{46EE67BF-C08B-0B4A-F35D-CAB41281B143}"/>
+              </a:ext>
+            </a:extLst>
+          </p:cNvPr>
+          <p:cNvSpPr>
+            <a:spLocks noGrp="1"/>
+          </p:cNvSpPr>
+          <p:nvPr>
+            <p:ph type="dt" sz="half" idx="10"/>
+          </p:nvPr>
+        </p:nvSpPr>
+        <p:spPr/>
+        <p:txBody>
+          <a:bodyPr/>
+          <a:lstStyle/>
+          <a:p>
+            <a:fld id="{CC10B3C9-ABD8-4175-ADB7-44BB334DBA1F}" type="datetime1">
               <a:rPr lang="de-DE" smtClean="0"/>
-              <a:t>08.12.2023</a:t>
+              <a:t>12.12.2023</a:t>
             </a:fld>
             <a:endParaRPr lang="de-DE"/>
           </a:p>
@@ -3701,12 +4063,18 @@
       </p:sp>
       <p:sp>
         <p:nvSpPr>
-          <p:cNvPr id="4" name="Fußzeilenplatzhalter 3"/>
-          <p:cNvSpPr>
-            <a:spLocks noGrp="1"/>
-          </p:cNvSpPr>
-          <p:nvPr>
-            <p:ph type="ftr" sz="quarter" idx="15"/>
+          <p:cNvPr id="5" name="Fußzeilenplatzhalter 4">
+            <a:extLst>
+              <a:ext uri="{FF2B5EF4-FFF2-40B4-BE49-F238E27FC236}">
+                <a16:creationId xmlns:a16="http://schemas.microsoft.com/office/drawing/2014/main" id="{CE7BAE3F-2C00-5C83-9744-0E75AC943689}"/>
+              </a:ext>
+            </a:extLst>
+          </p:cNvPr>
+          <p:cNvSpPr>
+            <a:spLocks noGrp="1"/>
+          </p:cNvSpPr>
+          <p:nvPr>
+            <p:ph type="ftr" sz="quarter" idx="11"/>
           </p:nvPr>
         </p:nvSpPr>
         <p:spPr/>
@@ -3715,20 +4083,27 @@
           <a:lstStyle/>
           <a:p>
             <a:r>
-              <a:rPr lang="de-DE" dirty="0"/>
-              <a:t>Heiko Waschek, Tim Keicher</a:t>
-            </a:r>
-          </a:p>
-        </p:txBody>
-      </p:sp>
-      <p:sp>
-        <p:nvSpPr>
-          <p:cNvPr id="5" name="Foliennummernplatzhalter 4"/>
-          <p:cNvSpPr>
-            <a:spLocks noGrp="1"/>
-          </p:cNvSpPr>
-          <p:nvPr>
-            <p:ph type="sldNum" sz="quarter" idx="16"/>
+              <a:rPr lang="de-DE"/>
+              <a:t>Heiko Wascheck, Tim Keicher</a:t>
+            </a:r>
+            <a:endParaRPr lang="de-DE" dirty="0"/>
+          </a:p>
+        </p:txBody>
+      </p:sp>
+      <p:sp>
+        <p:nvSpPr>
+          <p:cNvPr id="6" name="Foliennummernplatzhalter 5">
+            <a:extLst>
+              <a:ext uri="{FF2B5EF4-FFF2-40B4-BE49-F238E27FC236}">
+                <a16:creationId xmlns:a16="http://schemas.microsoft.com/office/drawing/2014/main" id="{8625A9AB-A32C-659B-4D9F-98E870A03EF8}"/>
+              </a:ext>
+            </a:extLst>
+          </p:cNvPr>
+          <p:cNvSpPr>
+            <a:spLocks noGrp="1"/>
+          </p:cNvSpPr>
+          <p:nvPr>
+            <p:ph type="sldNum" sz="quarter" idx="12"/>
           </p:nvPr>
         </p:nvSpPr>
         <p:spPr/>
@@ -3748,40 +4123,12 @@
           </a:p>
         </p:txBody>
       </p:sp>
-      <p:sp>
-        <p:nvSpPr>
-          <p:cNvPr id="6" name="Textplatzhalter 5"/>
-          <p:cNvSpPr>
-            <a:spLocks noGrp="1"/>
-          </p:cNvSpPr>
-          <p:nvPr>
-            <p:ph type="body" sz="quarter" idx="17"/>
-          </p:nvPr>
-        </p:nvSpPr>
-        <p:spPr>
-          <a:xfrm>
-            <a:off x="746836" y="1704975"/>
-            <a:ext cx="5153031" cy="4287838"/>
-          </a:xfrm>
-        </p:spPr>
-        <p:txBody>
-          <a:bodyPr anchor="ctr"/>
-          <a:lstStyle/>
-          <a:p>
-            <a:pPr algn="ctr"/>
-            <a:r>
-              <a:rPr lang="de-DE" sz="4800" dirty="0"/>
-              <a:t>Vielen Dank für ihre Aufmerksamkeit!</a:t>
-            </a:r>
-          </a:p>
-        </p:txBody>
-      </p:sp>
       <p:pic>
         <p:nvPicPr>
-          <p:cNvPr id="9" name="Grafik 8">
+          <p:cNvPr id="8" name="Grafik 7">
             <a:extLst>
               <a:ext uri="{FF2B5EF4-FFF2-40B4-BE49-F238E27FC236}">
-                <a16:creationId xmlns:a16="http://schemas.microsoft.com/office/drawing/2014/main" id="{943B142F-4BD2-EC40-119F-E07871F7C0CA}"/>
+                <a16:creationId xmlns:a16="http://schemas.microsoft.com/office/drawing/2014/main" id="{35FF699F-967C-9816-DED9-76CAFDE430BE}"/>
               </a:ext>
             </a:extLst>
           </p:cNvPr>
@@ -3798,8 +4145,38 @@
         </p:blipFill>
         <p:spPr>
           <a:xfrm>
-            <a:off x="6292135" y="2322725"/>
-            <a:ext cx="5402607" cy="3045980"/>
+            <a:off x="4710025" y="4132758"/>
+            <a:ext cx="2530059" cy="327688"/>
+          </a:xfrm>
+          <a:prstGeom prst="rect">
+            <a:avLst/>
+          </a:prstGeom>
+        </p:spPr>
+      </p:pic>
+      <p:pic>
+        <p:nvPicPr>
+          <p:cNvPr id="10" name="Grafik 9">
+            <a:extLst>
+              <a:ext uri="{FF2B5EF4-FFF2-40B4-BE49-F238E27FC236}">
+                <a16:creationId xmlns:a16="http://schemas.microsoft.com/office/drawing/2014/main" id="{9FBABA24-DA10-A78A-2F64-9D4A4A8C3D85}"/>
+              </a:ext>
+            </a:extLst>
+          </p:cNvPr>
+          <p:cNvPicPr>
+            <a:picLocks noChangeAspect="1"/>
+          </p:cNvPicPr>
+          <p:nvPr/>
+        </p:nvPicPr>
+        <p:blipFill>
+          <a:blip r:embed="rId3"/>
+          <a:stretch>
+            <a:fillRect/>
+          </a:stretch>
+        </p:blipFill>
+        <p:spPr>
+          <a:xfrm>
+            <a:off x="4740507" y="5805504"/>
+            <a:ext cx="2499577" cy="342930"/>
           </a:xfrm>
           <a:prstGeom prst="rect">
             <a:avLst/>
@@ -3809,7 +4186,309 @@
     </p:spTree>
     <p:extLst>
       <p:ext uri="{BB962C8B-B14F-4D97-AF65-F5344CB8AC3E}">
-        <p14:creationId xmlns:p14="http://schemas.microsoft.com/office/powerpoint/2010/main" val="1047420940"/>
+        <p14:creationId xmlns:p14="http://schemas.microsoft.com/office/powerpoint/2010/main" val="277341268"/>
+      </p:ext>
+    </p:extLst>
+  </p:cSld>
+  <p:clrMapOvr>
+    <a:masterClrMapping/>
+  </p:clrMapOvr>
+</p:sld>
+</file>
+
+<file path=ppt/slides/slide9.xml><?xml version="1.0" encoding="utf-8"?>
+<p:sld xmlns:a="http://schemas.openxmlformats.org/drawingml/2006/main" xmlns:r="http://schemas.openxmlformats.org/officeDocument/2006/relationships" xmlns:p="http://schemas.openxmlformats.org/presentationml/2006/main">
+  <p:cSld>
+    <p:spTree>
+      <p:nvGrpSpPr>
+        <p:cNvPr id="1" name=""/>
+        <p:cNvGrpSpPr/>
+        <p:nvPr/>
+      </p:nvGrpSpPr>
+      <p:grpSpPr>
+        <a:xfrm>
+          <a:off x="0" y="0"/>
+          <a:ext cx="0" cy="0"/>
+          <a:chOff x="0" y="0"/>
+          <a:chExt cx="0" cy="0"/>
+        </a:xfrm>
+      </p:grpSpPr>
+      <p:sp>
+        <p:nvSpPr>
+          <p:cNvPr id="2" name="Titel 1">
+            <a:extLst>
+              <a:ext uri="{FF2B5EF4-FFF2-40B4-BE49-F238E27FC236}">
+                <a16:creationId xmlns:a16="http://schemas.microsoft.com/office/drawing/2014/main" id="{D0DD90DF-6D32-27FB-D36E-C3A28F62445A}"/>
+              </a:ext>
+            </a:extLst>
+          </p:cNvPr>
+          <p:cNvSpPr>
+            <a:spLocks noGrp="1"/>
+          </p:cNvSpPr>
+          <p:nvPr>
+            <p:ph type="title"/>
+          </p:nvPr>
+        </p:nvSpPr>
+        <p:spPr>
+          <a:xfrm>
+            <a:off x="838200" y="751438"/>
+            <a:ext cx="10515600" cy="939250"/>
+          </a:xfrm>
+        </p:spPr>
+        <p:txBody>
+          <a:bodyPr/>
+          <a:lstStyle/>
+          <a:p>
+            <a:r>
+              <a:rPr lang="de-DE" dirty="0"/>
+              <a:t>Plot Optimierung</a:t>
+            </a:r>
+          </a:p>
+        </p:txBody>
+      </p:sp>
+      <p:sp>
+        <p:nvSpPr>
+          <p:cNvPr id="3" name="Inhaltsplatzhalter 2">
+            <a:extLst>
+              <a:ext uri="{FF2B5EF4-FFF2-40B4-BE49-F238E27FC236}">
+                <a16:creationId xmlns:a16="http://schemas.microsoft.com/office/drawing/2014/main" id="{487A8827-801D-86F4-8BDA-7187B94A903D}"/>
+              </a:ext>
+            </a:extLst>
+          </p:cNvPr>
+          <p:cNvSpPr>
+            <a:spLocks noGrp="1"/>
+          </p:cNvSpPr>
+          <p:nvPr>
+            <p:ph idx="1"/>
+          </p:nvPr>
+        </p:nvSpPr>
+        <p:spPr/>
+        <p:txBody>
+          <a:bodyPr/>
+          <a:lstStyle/>
+          <a:p>
+            <a:r>
+              <a:rPr lang="de-DE" dirty="0"/>
+              <a:t>Optimierung v1 Test 2:</a:t>
+            </a:r>
+          </a:p>
+          <a:p>
+            <a:pPr lvl="1"/>
+            <a:r>
+              <a:rPr lang="de-DE" dirty="0"/>
+              <a:t>Alle 4-Plots sind eingebunden</a:t>
+            </a:r>
+          </a:p>
+          <a:p>
+            <a:pPr lvl="1"/>
+            <a:r>
+              <a:rPr lang="de-DE" dirty="0"/>
+              <a:t>Messung wie in Original Test 1</a:t>
+            </a:r>
+          </a:p>
+          <a:p>
+            <a:pPr lvl="1"/>
+            <a:r>
+              <a:rPr lang="de-DE" dirty="0"/>
+              <a:t>Dauer = 50,82 Sekunden</a:t>
+            </a:r>
+          </a:p>
+          <a:p>
+            <a:pPr lvl="1"/>
+            <a:endParaRPr lang="de-DE" dirty="0"/>
+          </a:p>
+          <a:p>
+            <a:r>
+              <a:rPr lang="de-DE" dirty="0"/>
+              <a:t>Original Test 2:</a:t>
+            </a:r>
+          </a:p>
+          <a:p>
+            <a:pPr lvl="1"/>
+            <a:r>
+              <a:rPr lang="de-DE" dirty="0"/>
+              <a:t>Dauer = 379,23 Sekunden</a:t>
+            </a:r>
+          </a:p>
+          <a:p>
+            <a:pPr lvl="1"/>
+            <a:endParaRPr lang="de-DE" dirty="0"/>
+          </a:p>
+          <a:p>
+            <a:r>
+              <a:rPr lang="de-DE" dirty="0"/>
+              <a:t>Zeitgewinn von ca.  327 Sekunden (Original bracht ca. 7,5mal so lang)</a:t>
+            </a:r>
+          </a:p>
+          <a:p>
+            <a:endParaRPr lang="de-DE" dirty="0"/>
+          </a:p>
+          <a:p>
+            <a:endParaRPr lang="de-DE" dirty="0"/>
+          </a:p>
+          <a:p>
+            <a:endParaRPr lang="de-DE" dirty="0"/>
+          </a:p>
+          <a:p>
+            <a:endParaRPr lang="de-DE" dirty="0"/>
+          </a:p>
+        </p:txBody>
+      </p:sp>
+      <p:sp>
+        <p:nvSpPr>
+          <p:cNvPr id="4" name="Datumsplatzhalter 3">
+            <a:extLst>
+              <a:ext uri="{FF2B5EF4-FFF2-40B4-BE49-F238E27FC236}">
+                <a16:creationId xmlns:a16="http://schemas.microsoft.com/office/drawing/2014/main" id="{46EE67BF-C08B-0B4A-F35D-CAB41281B143}"/>
+              </a:ext>
+            </a:extLst>
+          </p:cNvPr>
+          <p:cNvSpPr>
+            <a:spLocks noGrp="1"/>
+          </p:cNvSpPr>
+          <p:nvPr>
+            <p:ph type="dt" sz="half" idx="10"/>
+          </p:nvPr>
+        </p:nvSpPr>
+        <p:spPr/>
+        <p:txBody>
+          <a:bodyPr/>
+          <a:lstStyle/>
+          <a:p>
+            <a:fld id="{CC10B3C9-ABD8-4175-ADB7-44BB334DBA1F}" type="datetime1">
+              <a:rPr lang="de-DE" smtClean="0"/>
+              <a:t>12.12.2023</a:t>
+            </a:fld>
+            <a:endParaRPr lang="de-DE"/>
+          </a:p>
+        </p:txBody>
+      </p:sp>
+      <p:sp>
+        <p:nvSpPr>
+          <p:cNvPr id="5" name="Fußzeilenplatzhalter 4">
+            <a:extLst>
+              <a:ext uri="{FF2B5EF4-FFF2-40B4-BE49-F238E27FC236}">
+                <a16:creationId xmlns:a16="http://schemas.microsoft.com/office/drawing/2014/main" id="{CE7BAE3F-2C00-5C83-9744-0E75AC943689}"/>
+              </a:ext>
+            </a:extLst>
+          </p:cNvPr>
+          <p:cNvSpPr>
+            <a:spLocks noGrp="1"/>
+          </p:cNvSpPr>
+          <p:nvPr>
+            <p:ph type="ftr" sz="quarter" idx="11"/>
+          </p:nvPr>
+        </p:nvSpPr>
+        <p:spPr/>
+        <p:txBody>
+          <a:bodyPr/>
+          <a:lstStyle/>
+          <a:p>
+            <a:r>
+              <a:rPr lang="de-DE"/>
+              <a:t>Heiko Wascheck, Tim Keicher</a:t>
+            </a:r>
+            <a:endParaRPr lang="de-DE" dirty="0"/>
+          </a:p>
+        </p:txBody>
+      </p:sp>
+      <p:sp>
+        <p:nvSpPr>
+          <p:cNvPr id="6" name="Foliennummernplatzhalter 5">
+            <a:extLst>
+              <a:ext uri="{FF2B5EF4-FFF2-40B4-BE49-F238E27FC236}">
+                <a16:creationId xmlns:a16="http://schemas.microsoft.com/office/drawing/2014/main" id="{8625A9AB-A32C-659B-4D9F-98E870A03EF8}"/>
+              </a:ext>
+            </a:extLst>
+          </p:cNvPr>
+          <p:cNvSpPr>
+            <a:spLocks noGrp="1"/>
+          </p:cNvSpPr>
+          <p:nvPr>
+            <p:ph type="sldNum" sz="quarter" idx="12"/>
+          </p:nvPr>
+        </p:nvSpPr>
+        <p:spPr/>
+        <p:txBody>
+          <a:bodyPr/>
+          <a:lstStyle/>
+          <a:p>
+            <a:fld id="{813E575C-CD74-45A2-8EB8-54D624340A2E}" type="slidenum">
+              <a:rPr lang="de-DE" smtClean="0"/>
+              <a:pPr/>
+              <a:t>9</a:t>
+            </a:fld>
+            <a:r>
+              <a:rPr lang="de-DE"/>
+              <a:t> / 15</a:t>
+            </a:r>
+          </a:p>
+        </p:txBody>
+      </p:sp>
+      <p:pic>
+        <p:nvPicPr>
+          <p:cNvPr id="9" name="Grafik 8">
+            <a:extLst>
+              <a:ext uri="{FF2B5EF4-FFF2-40B4-BE49-F238E27FC236}">
+                <a16:creationId xmlns:a16="http://schemas.microsoft.com/office/drawing/2014/main" id="{B452815E-DBA0-2919-F978-5496AB031861}"/>
+              </a:ext>
+            </a:extLst>
+          </p:cNvPr>
+          <p:cNvPicPr>
+            <a:picLocks noChangeAspect="1"/>
+          </p:cNvPicPr>
+          <p:nvPr/>
+        </p:nvPicPr>
+        <p:blipFill>
+          <a:blip r:embed="rId2"/>
+          <a:stretch>
+            <a:fillRect/>
+          </a:stretch>
+        </p:blipFill>
+        <p:spPr>
+          <a:xfrm>
+            <a:off x="4834780" y="3108932"/>
+            <a:ext cx="2522439" cy="320068"/>
+          </a:xfrm>
+          <a:prstGeom prst="rect">
+            <a:avLst/>
+          </a:prstGeom>
+        </p:spPr>
+      </p:pic>
+      <p:pic>
+        <p:nvPicPr>
+          <p:cNvPr id="12" name="Grafik 11">
+            <a:extLst>
+              <a:ext uri="{FF2B5EF4-FFF2-40B4-BE49-F238E27FC236}">
+                <a16:creationId xmlns:a16="http://schemas.microsoft.com/office/drawing/2014/main" id="{7DC305AD-1CE5-57D1-AB71-0CCD111C7149}"/>
+              </a:ext>
+            </a:extLst>
+          </p:cNvPr>
+          <p:cNvPicPr>
+            <a:picLocks noChangeAspect="1"/>
+          </p:cNvPicPr>
+          <p:nvPr/>
+        </p:nvPicPr>
+        <p:blipFill>
+          <a:blip r:embed="rId3"/>
+          <a:stretch>
+            <a:fillRect/>
+          </a:stretch>
+        </p:blipFill>
+        <p:spPr>
+          <a:xfrm>
+            <a:off x="4834780" y="4399860"/>
+            <a:ext cx="2530059" cy="312447"/>
+          </a:xfrm>
+          <a:prstGeom prst="rect">
+            <a:avLst/>
+          </a:prstGeom>
+        </p:spPr>
+      </p:pic>
+    </p:spTree>
+    <p:extLst>
+      <p:ext uri="{BB962C8B-B14F-4D97-AF65-F5344CB8AC3E}">
+        <p14:creationId xmlns:p14="http://schemas.microsoft.com/office/powerpoint/2010/main" val="3150211486"/>
       </p:ext>
     </p:extLst>
   </p:cSld>

</xml_diff>

<commit_message>
update PowerPoint, remove unsused function
</commit_message>
<xml_diff>
--- a/Projektverlauf.pptx
+++ b/Projektverlauf.pptx
@@ -427,7 +427,7 @@
           <a:p>
             <a:fld id="{556C8D3A-C9AC-4E8C-B5B4-449B2A3F85BA}" type="datetimeFigureOut">
               <a:rPr lang="de-DE" smtClean="0"/>
-              <a:t>19.12.2023</a:t>
+              <a:t>20.12.2023</a:t>
             </a:fld>
             <a:endParaRPr lang="de-DE"/>
           </a:p>
@@ -952,7 +952,7 @@
           <a:p>
             <a:fld id="{444ABF0E-CEE9-4329-9A06-8640FCA04ECF}" type="datetime1">
               <a:rPr lang="de-DE" smtClean="0"/>
-              <a:t>19.12.2023</a:t>
+              <a:t>20.12.2023</a:t>
             </a:fld>
             <a:endParaRPr lang="de-DE"/>
           </a:p>
@@ -1229,7 +1229,7 @@
           <a:p>
             <a:fld id="{CC10B3C9-ABD8-4175-ADB7-44BB334DBA1F}" type="datetime1">
               <a:rPr lang="de-DE" smtClean="0"/>
-              <a:t>19.12.2023</a:t>
+              <a:t>20.12.2023</a:t>
             </a:fld>
             <a:endParaRPr lang="de-DE"/>
           </a:p>
@@ -1395,7 +1395,7 @@
           <a:p>
             <a:fld id="{444ABF0E-CEE9-4329-9A06-8640FCA04ECF}" type="datetime1">
               <a:rPr lang="de-DE" smtClean="0"/>
-              <a:t>19.12.2023</a:t>
+              <a:t>20.12.2023</a:t>
             </a:fld>
             <a:endParaRPr lang="de-DE"/>
           </a:p>
@@ -1562,7 +1562,7 @@
           <a:p>
             <a:fld id="{444ABF0E-CEE9-4329-9A06-8640FCA04ECF}" type="datetime1">
               <a:rPr lang="de-DE" smtClean="0"/>
-              <a:t>19.12.2023</a:t>
+              <a:t>20.12.2023</a:t>
             </a:fld>
             <a:endParaRPr lang="de-DE"/>
           </a:p>
@@ -2213,7 +2213,7 @@
           <a:p>
             <a:fld id="{444ABF0E-CEE9-4329-9A06-8640FCA04ECF}" type="datetime1">
               <a:rPr lang="de-DE" smtClean="0"/>
-              <a:t>19.12.2023</a:t>
+              <a:t>20.12.2023</a:t>
             </a:fld>
             <a:endParaRPr lang="de-DE"/>
           </a:p>
@@ -2401,7 +2401,7 @@
           <a:p>
             <a:fld id="{444ABF0E-CEE9-4329-9A06-8640FCA04ECF}" type="datetime1">
               <a:rPr lang="de-DE" smtClean="0"/>
-              <a:t>19.12.2023</a:t>
+              <a:t>20.12.2023</a:t>
             </a:fld>
             <a:endParaRPr lang="de-DE"/>
           </a:p>
@@ -2742,7 +2742,7 @@
           <a:p>
             <a:fld id="{CC10B3C9-ABD8-4175-ADB7-44BB334DBA1F}" type="datetime1">
               <a:rPr lang="de-DE" smtClean="0"/>
-              <a:t>19.12.2023</a:t>
+              <a:t>20.12.2023</a:t>
             </a:fld>
             <a:endParaRPr lang="de-DE"/>
           </a:p>
@@ -3049,7 +3049,7 @@
           <a:p>
             <a:fld id="{CC10B3C9-ABD8-4175-ADB7-44BB334DBA1F}" type="datetime1">
               <a:rPr lang="de-DE" smtClean="0"/>
-              <a:t>19.12.2023</a:t>
+              <a:t>20.12.2023</a:t>
             </a:fld>
             <a:endParaRPr lang="de-DE"/>
           </a:p>
@@ -3289,7 +3289,7 @@
           <a:p>
             <a:fld id="{CC10B3C9-ABD8-4175-ADB7-44BB334DBA1F}" type="datetime1">
               <a:rPr lang="de-DE" smtClean="0"/>
-              <a:t>19.12.2023</a:t>
+              <a:t>20.12.2023</a:t>
             </a:fld>
             <a:endParaRPr lang="de-DE"/>
           </a:p>
@@ -3552,11 +3552,34 @@
           <a:p>
             <a:r>
               <a:rPr lang="de-DE" dirty="0"/>
-              <a:t>Konfiguration des Roboters (Tim)</a:t>
-            </a:r>
-          </a:p>
-          <a:p>
-            <a:endParaRPr lang="de-DE" dirty="0"/>
+              <a:t>Konfiguration des Roboters (Tim) (</a:t>
+            </a:r>
+            <a:r>
+              <a:rPr lang="de-DE" dirty="0">
+                <a:solidFill>
+                  <a:schemeClr val="accent6"/>
+                </a:solidFill>
+              </a:rPr>
+              <a:t>✔</a:t>
+            </a:r>
+            <a:r>
+              <a:rPr lang="de-DE" dirty="0"/>
+              <a:t>)</a:t>
+            </a:r>
+          </a:p>
+          <a:p>
+            <a:r>
+              <a:rPr lang="de-DE" dirty="0"/>
+              <a:t>Graphische Oberfläche via </a:t>
+            </a:r>
+            <a:r>
+              <a:rPr lang="de-DE" dirty="0" err="1"/>
+              <a:t>MatLab</a:t>
+            </a:r>
+            <a:r>
+              <a:rPr lang="de-DE" dirty="0"/>
+              <a:t>-App-Designer (Tim)</a:t>
+            </a:r>
           </a:p>
           <a:p>
             <a:endParaRPr lang="de-DE" dirty="0"/>
@@ -3589,7 +3612,7 @@
           <a:p>
             <a:fld id="{CC10B3C9-ABD8-4175-ADB7-44BB334DBA1F}" type="datetime1">
               <a:rPr lang="de-DE" smtClean="0"/>
-              <a:t>19.12.2023</a:t>
+              <a:t>20.12.2023</a:t>
             </a:fld>
             <a:endParaRPr lang="de-DE" dirty="0"/>
           </a:p>
@@ -3678,7 +3701,7 @@
 </file>
 
 <file path=ppt/slides/slide7.xml><?xml version="1.0" encoding="utf-8"?>
-<p:sld xmlns:a="http://schemas.openxmlformats.org/drawingml/2006/main" xmlns:r="http://schemas.openxmlformats.org/officeDocument/2006/relationships" xmlns:p="http://schemas.openxmlformats.org/presentationml/2006/main">
+<p:sld xmlns:a="http://schemas.openxmlformats.org/drawingml/2006/main" xmlns:r="http://schemas.openxmlformats.org/officeDocument/2006/relationships" xmlns:p="http://schemas.openxmlformats.org/presentationml/2006/main" show="0">
   <p:cSld>
     <p:spTree>
       <p:nvGrpSpPr>
@@ -3799,7 +3822,7 @@
           <a:p>
             <a:fld id="{CC10B3C9-ABD8-4175-ADB7-44BB334DBA1F}" type="datetime1">
               <a:rPr lang="de-DE" smtClean="0"/>
-              <a:t>19.12.2023</a:t>
+              <a:t>20.12.2023</a:t>
             </a:fld>
             <a:endParaRPr lang="de-DE"/>
           </a:p>
@@ -4108,7 +4131,7 @@
           <a:p>
             <a:fld id="{CC10B3C9-ABD8-4175-ADB7-44BB334DBA1F}" type="datetime1">
               <a:rPr lang="de-DE" smtClean="0"/>
-              <a:t>19.12.2023</a:t>
+              <a:t>20.12.2023</a:t>
             </a:fld>
             <a:endParaRPr lang="de-DE"/>
           </a:p>
@@ -4410,7 +4433,7 @@
           <a:p>
             <a:fld id="{CC10B3C9-ABD8-4175-ADB7-44BB334DBA1F}" type="datetime1">
               <a:rPr lang="de-DE" smtClean="0"/>
-              <a:t>19.12.2023</a:t>
+              <a:t>20.12.2023</a:t>
             </a:fld>
             <a:endParaRPr lang="de-DE"/>
           </a:p>

</xml_diff>